<commit_message>
U fixed issue with slides without notes
</commit_message>
<xml_diff>
--- a/samples/deportes.pptx
+++ b/samples/deportes.pptx
@@ -5,13 +5,14 @@
     <p:sldMasterId id="2147483672" r:id="rId1"/>
   </p:sldMasterIdLst>
   <p:notesMasterIdLst>
-    <p:notesMasterId r:id="rId6"/>
+    <p:notesMasterId r:id="rId7"/>
   </p:notesMasterIdLst>
   <p:sldIdLst>
     <p:sldId id="256" r:id="rId2"/>
     <p:sldId id="258" r:id="rId3"/>
     <p:sldId id="257" r:id="rId4"/>
-    <p:sldId id="259" r:id="rId5"/>
+    <p:sldId id="260" r:id="rId5"/>
+    <p:sldId id="259" r:id="rId6"/>
   </p:sldIdLst>
   <p:sldSz cx="9144000" cy="6858000" type="screen4x3"/>
   <p:notesSz cx="6858000" cy="9144000"/>
@@ -196,7 +197,7 @@
             <a:fld id="{A253A44E-BF11-45B9-BAB9-AA08FD2D2988}" type="datetimeFigureOut">
               <a:rPr lang="es-ES" smtClean="0"/>
               <a:pPr/>
-              <a:t>16/05/2019</a:t>
+              <a:t>28/05/2019</a:t>
             </a:fld>
             <a:endParaRPr lang="es-ES"/>
           </a:p>
@@ -826,6 +827,88 @@
           </a:bodyPr>
           <a:lstStyle/>
           <a:p>
+            <a:endParaRPr lang="es-ES" dirty="0"/>
+          </a:p>
+        </p:txBody>
+      </p:sp>
+      <p:sp>
+        <p:nvSpPr>
+          <p:cNvPr id="4" name="3 Marcador de número de diapositiva"/>
+          <p:cNvSpPr>
+            <a:spLocks noGrp="1"/>
+          </p:cNvSpPr>
+          <p:nvPr>
+            <p:ph type="sldNum" sz="quarter" idx="10"/>
+          </p:nvPr>
+        </p:nvSpPr>
+        <p:spPr/>
+        <p:txBody>
+          <a:bodyPr/>
+          <a:lstStyle/>
+          <a:p>
+            <a:fld id="{77BFB05A-F0A3-4666-A4C6-6C788083C956}" type="slidenum">
+              <a:rPr lang="es-ES" smtClean="0"/>
+              <a:pPr/>
+              <a:t>4</a:t>
+            </a:fld>
+            <a:endParaRPr lang="es-ES"/>
+          </a:p>
+        </p:txBody>
+      </p:sp>
+    </p:spTree>
+  </p:cSld>
+  <p:clrMapOvr>
+    <a:masterClrMapping/>
+  </p:clrMapOvr>
+</p:notes>
+</file>
+
+<file path=ppt/notesSlides/notesSlide5.xml><?xml version="1.0" encoding="utf-8"?>
+<p:notes xmlns:a="http://schemas.openxmlformats.org/drawingml/2006/main" xmlns:r="http://schemas.openxmlformats.org/officeDocument/2006/relationships" xmlns:p="http://schemas.openxmlformats.org/presentationml/2006/main">
+  <p:cSld>
+    <p:spTree>
+      <p:nvGrpSpPr>
+        <p:cNvPr id="1" name=""/>
+        <p:cNvGrpSpPr/>
+        <p:nvPr/>
+      </p:nvGrpSpPr>
+      <p:grpSpPr>
+        <a:xfrm>
+          <a:off x="0" y="0"/>
+          <a:ext cx="0" cy="0"/>
+          <a:chOff x="0" y="0"/>
+          <a:chExt cx="0" cy="0"/>
+        </a:xfrm>
+      </p:grpSpPr>
+      <p:sp>
+        <p:nvSpPr>
+          <p:cNvPr id="2" name="1 Marcador de imagen de diapositiva"/>
+          <p:cNvSpPr>
+            <a:spLocks noGrp="1" noRot="1" noChangeAspect="1"/>
+          </p:cNvSpPr>
+          <p:nvPr>
+            <p:ph type="sldImg"/>
+          </p:nvPr>
+        </p:nvSpPr>
+        <p:spPr/>
+      </p:sp>
+      <p:sp>
+        <p:nvSpPr>
+          <p:cNvPr id="3" name="2 Marcador de notas"/>
+          <p:cNvSpPr>
+            <a:spLocks noGrp="1"/>
+          </p:cNvSpPr>
+          <p:nvPr>
+            <p:ph type="body" idx="1"/>
+          </p:nvPr>
+        </p:nvSpPr>
+        <p:spPr/>
+        <p:txBody>
+          <a:bodyPr>
+            <a:normAutofit/>
+          </a:bodyPr>
+          <a:lstStyle/>
+          <a:p>
             <a:r>
               <a:rPr lang="es-ES" dirty="0" smtClean="0"/>
               <a:t>El tenis es un deporte practicado sobre una pista o cancha rectangular de césped verde, sintética, dura o arcilla.​ Se disputa entre dos jugadores (individuales) o entre dos parejas (dobles). </a:t>
@@ -856,7 +939,7 @@
             <a:fld id="{77BFB05A-F0A3-4666-A4C6-6C788083C956}" type="slidenum">
               <a:rPr lang="es-ES" smtClean="0"/>
               <a:pPr/>
-              <a:t>4</a:t>
+              <a:t>5</a:t>
             </a:fld>
             <a:endParaRPr lang="es-ES"/>
           </a:p>
@@ -1052,7 +1135,7 @@
             <a:fld id="{7A847CFC-816F-41D0-AAC0-9BF4FEBC753E}" type="datetimeFigureOut">
               <a:rPr lang="es-ES" smtClean="0"/>
               <a:pPr/>
-              <a:t>16/05/2019</a:t>
+              <a:t>28/05/2019</a:t>
             </a:fld>
             <a:endParaRPr lang="es-ES"/>
           </a:p>
@@ -1219,7 +1302,7 @@
             <a:fld id="{7A847CFC-816F-41D0-AAC0-9BF4FEBC753E}" type="datetimeFigureOut">
               <a:rPr lang="es-ES" smtClean="0"/>
               <a:pPr/>
-              <a:t>16/05/2019</a:t>
+              <a:t>28/05/2019</a:t>
             </a:fld>
             <a:endParaRPr lang="es-ES"/>
           </a:p>
@@ -1396,7 +1479,7 @@
             <a:fld id="{7A847CFC-816F-41D0-AAC0-9BF4FEBC753E}" type="datetimeFigureOut">
               <a:rPr lang="es-ES" smtClean="0"/>
               <a:pPr/>
-              <a:t>16/05/2019</a:t>
+              <a:t>28/05/2019</a:t>
             </a:fld>
             <a:endParaRPr lang="es-ES"/>
           </a:p>
@@ -1563,7 +1646,7 @@
             <a:fld id="{7A847CFC-816F-41D0-AAC0-9BF4FEBC753E}" type="datetimeFigureOut">
               <a:rPr lang="es-ES" smtClean="0"/>
               <a:pPr/>
-              <a:t>16/05/2019</a:t>
+              <a:t>28/05/2019</a:t>
             </a:fld>
             <a:endParaRPr lang="es-ES"/>
           </a:p>
@@ -1806,7 +1889,7 @@
             <a:fld id="{7A847CFC-816F-41D0-AAC0-9BF4FEBC753E}" type="datetimeFigureOut">
               <a:rPr lang="es-ES" smtClean="0"/>
               <a:pPr/>
-              <a:t>16/05/2019</a:t>
+              <a:t>28/05/2019</a:t>
             </a:fld>
             <a:endParaRPr lang="es-ES"/>
           </a:p>
@@ -2091,7 +2174,7 @@
             <a:fld id="{7A847CFC-816F-41D0-AAC0-9BF4FEBC753E}" type="datetimeFigureOut">
               <a:rPr lang="es-ES" smtClean="0"/>
               <a:pPr/>
-              <a:t>16/05/2019</a:t>
+              <a:t>28/05/2019</a:t>
             </a:fld>
             <a:endParaRPr lang="es-ES"/>
           </a:p>
@@ -2510,7 +2593,7 @@
             <a:fld id="{7A847CFC-816F-41D0-AAC0-9BF4FEBC753E}" type="datetimeFigureOut">
               <a:rPr lang="es-ES" smtClean="0"/>
               <a:pPr/>
-              <a:t>16/05/2019</a:t>
+              <a:t>28/05/2019</a:t>
             </a:fld>
             <a:endParaRPr lang="es-ES"/>
           </a:p>
@@ -2625,7 +2708,7 @@
             <a:fld id="{7A847CFC-816F-41D0-AAC0-9BF4FEBC753E}" type="datetimeFigureOut">
               <a:rPr lang="es-ES" smtClean="0"/>
               <a:pPr/>
-              <a:t>16/05/2019</a:t>
+              <a:t>28/05/2019</a:t>
             </a:fld>
             <a:endParaRPr lang="es-ES"/>
           </a:p>
@@ -2717,7 +2800,7 @@
             <a:fld id="{7A847CFC-816F-41D0-AAC0-9BF4FEBC753E}" type="datetimeFigureOut">
               <a:rPr lang="es-ES" smtClean="0"/>
               <a:pPr/>
-              <a:t>16/05/2019</a:t>
+              <a:t>28/05/2019</a:t>
             </a:fld>
             <a:endParaRPr lang="es-ES"/>
           </a:p>
@@ -2991,7 +3074,7 @@
             <a:fld id="{7A847CFC-816F-41D0-AAC0-9BF4FEBC753E}" type="datetimeFigureOut">
               <a:rPr lang="es-ES" smtClean="0"/>
               <a:pPr/>
-              <a:t>16/05/2019</a:t>
+              <a:t>28/05/2019</a:t>
             </a:fld>
             <a:endParaRPr lang="es-ES"/>
           </a:p>
@@ -3241,7 +3324,7 @@
             <a:fld id="{7A847CFC-816F-41D0-AAC0-9BF4FEBC753E}" type="datetimeFigureOut">
               <a:rPr lang="es-ES" smtClean="0"/>
               <a:pPr/>
-              <a:t>16/05/2019</a:t>
+              <a:t>28/05/2019</a:t>
             </a:fld>
             <a:endParaRPr lang="es-ES"/>
           </a:p>
@@ -3451,7 +3534,7 @@
             <a:fld id="{7A847CFC-816F-41D0-AAC0-9BF4FEBC753E}" type="datetimeFigureOut">
               <a:rPr lang="es-ES" smtClean="0"/>
               <a:pPr/>
-              <a:t>16/05/2019</a:t>
+              <a:t>28/05/2019</a:t>
             </a:fld>
             <a:endParaRPr lang="es-ES"/>
           </a:p>
@@ -4025,6 +4108,90 @@
 </file>
 
 <file path=ppt/slides/slide4.xml><?xml version="1.0" encoding="utf-8"?>
+<p:sld xmlns:a="http://schemas.openxmlformats.org/drawingml/2006/main" xmlns:r="http://schemas.openxmlformats.org/officeDocument/2006/relationships" xmlns:p="http://schemas.openxmlformats.org/presentationml/2006/main">
+  <p:cSld>
+    <p:spTree>
+      <p:nvGrpSpPr>
+        <p:cNvPr id="1" name=""/>
+        <p:cNvGrpSpPr/>
+        <p:nvPr/>
+      </p:nvGrpSpPr>
+      <p:grpSpPr>
+        <a:xfrm>
+          <a:off x="0" y="0"/>
+          <a:ext cx="0" cy="0"/>
+          <a:chOff x="0" y="0"/>
+          <a:chExt cx="0" cy="0"/>
+        </a:xfrm>
+      </p:grpSpPr>
+      <p:sp>
+        <p:nvSpPr>
+          <p:cNvPr id="2" name="1 Título"/>
+          <p:cNvSpPr>
+            <a:spLocks noGrp="1"/>
+          </p:cNvSpPr>
+          <p:nvPr>
+            <p:ph type="title"/>
+          </p:nvPr>
+        </p:nvSpPr>
+        <p:spPr/>
+        <p:txBody>
+          <a:bodyPr/>
+          <a:lstStyle/>
+          <a:p>
+            <a:r>
+              <a:rPr lang="es-ES" dirty="0" smtClean="0"/>
+              <a:t>Ping </a:t>
+            </a:r>
+            <a:r>
+              <a:rPr lang="es-ES" dirty="0" err="1" smtClean="0"/>
+              <a:t>pong</a:t>
+            </a:r>
+            <a:endParaRPr lang="es-ES" dirty="0"/>
+          </a:p>
+        </p:txBody>
+      </p:sp>
+      <p:pic>
+        <p:nvPicPr>
+          <p:cNvPr id="1026" name="Picture 2"/>
+          <p:cNvPicPr>
+            <a:picLocks noChangeAspect="1" noChangeArrowheads="1"/>
+          </p:cNvPicPr>
+          <p:nvPr/>
+        </p:nvPicPr>
+        <p:blipFill>
+          <a:blip r:embed="rId3" cstate="print"/>
+          <a:srcRect/>
+          <a:stretch>
+            <a:fillRect/>
+          </a:stretch>
+        </p:blipFill>
+        <p:spPr bwMode="auto">
+          <a:xfrm>
+            <a:off x="1633538" y="1804988"/>
+            <a:ext cx="5876925" cy="3248025"/>
+          </a:xfrm>
+          <a:prstGeom prst="rect">
+            <a:avLst/>
+          </a:prstGeom>
+          <a:noFill/>
+          <a:ln w="9525">
+            <a:noFill/>
+            <a:miter lim="800000"/>
+            <a:headEnd/>
+            <a:tailEnd/>
+          </a:ln>
+        </p:spPr>
+      </p:pic>
+    </p:spTree>
+  </p:cSld>
+  <p:clrMapOvr>
+    <a:masterClrMapping/>
+  </p:clrMapOvr>
+</p:sld>
+</file>
+
+<file path=ppt/slides/slide5.xml><?xml version="1.0" encoding="utf-8"?>
 <p:sld xmlns:a="http://schemas.openxmlformats.org/drawingml/2006/main" xmlns:r="http://schemas.openxmlformats.org/officeDocument/2006/relationships" xmlns:p="http://schemas.openxmlformats.org/presentationml/2006/main">
   <p:cSld>
     <p:spTree>

</xml_diff>